<commit_message>
Finished up the notebooks
</commit_message>
<xml_diff>
--- a/slides/L3_Linear_draft.pptx
+++ b/slides/L3_Linear_draft.pptx
@@ -258,7 +258,7 @@
           <a:p>
             <a:fld id="{B878CD55-C935-4955-8EC6-E7D57C1DC36B}" type="datetimeFigureOut">
               <a:rPr lang="en-MY" smtClean="0"/>
-              <a:t>16/9/2018</a:t>
+              <a:t>17/9/2018</a:t>
             </a:fld>
             <a:endParaRPr lang="en-MY"/>
           </a:p>
@@ -1346,7 +1346,7 @@
           <a:p>
             <a:fld id="{1D8BD707-D9CF-40AE-B4C6-C98DA3205C09}" type="datetimeFigureOut">
               <a:rPr lang="en-US"/>
-              <a:t>9/16/2018</a:t>
+              <a:t>9/17/2018</a:t>
             </a:fld>
             <a:endParaRPr lang="en-US"/>
           </a:p>
@@ -1529,7 +1529,7 @@
           <a:p>
             <a:fld id="{1D8BD707-D9CF-40AE-B4C6-C98DA3205C09}" type="datetimeFigureOut">
               <a:rPr lang="en-US"/>
-              <a:t>9/16/2018</a:t>
+              <a:t>9/17/2018</a:t>
             </a:fld>
             <a:endParaRPr lang="en-US"/>
           </a:p>
@@ -1749,7 +1749,7 @@
           <a:p>
             <a:fld id="{1D8BD707-D9CF-40AE-B4C6-C98DA3205C09}" type="datetimeFigureOut">
               <a:rPr lang="en-US"/>
-              <a:t>9/16/2018</a:t>
+              <a:t>9/17/2018</a:t>
             </a:fld>
             <a:endParaRPr lang="en-US"/>
           </a:p>
@@ -1903,7 +1903,7 @@
           <a:p>
             <a:fld id="{1D8BD707-D9CF-40AE-B4C6-C98DA3205C09}" type="datetimeFigureOut">
               <a:rPr lang="en-US"/>
-              <a:t>9/16/2018</a:t>
+              <a:t>9/17/2018</a:t>
             </a:fld>
             <a:endParaRPr lang="en-US"/>
           </a:p>
@@ -2086,7 +2086,7 @@
           <a:p>
             <a:fld id="{1D8BD707-D9CF-40AE-B4C6-C98DA3205C09}" type="datetimeFigureOut">
               <a:rPr lang="en-US"/>
-              <a:t>9/16/2018</a:t>
+              <a:t>9/17/2018</a:t>
             </a:fld>
             <a:endParaRPr lang="en-US"/>
           </a:p>
@@ -2417,7 +2417,7 @@
           <a:p>
             <a:fld id="{1D8BD707-D9CF-40AE-B4C6-C98DA3205C09}" type="datetimeFigureOut">
               <a:rPr lang="en-US"/>
-              <a:t>9/16/2018</a:t>
+              <a:t>9/17/2018</a:t>
             </a:fld>
             <a:endParaRPr lang="en-US"/>
           </a:p>
@@ -11862,8 +11862,8 @@
           </p:sp>
         </mc:Fallback>
       </mc:AlternateContent>
-      <mc:AlternateContent xmlns:mc="http://schemas.openxmlformats.org/markup-compatibility/2006">
-        <mc:Choice xmlns:a14="http://schemas.microsoft.com/office/drawing/2010/main" Requires="a14">
+      <mc:AlternateContent xmlns:mc="http://schemas.openxmlformats.org/markup-compatibility/2006" xmlns:a14="http://schemas.microsoft.com/office/drawing/2010/main">
+        <mc:Choice Requires="a14">
           <p:sp>
             <p:nvSpPr>
               <p:cNvPr id="9" name="Rectangle 8">
@@ -12114,7 +12114,7 @@
                           <m:d>
                             <m:dPr>
                               <m:ctrlPr>
-                                <a:rPr lang="en-MY" sz="1000">
+                                <a:rPr lang="en-MY" sz="1000" i="1">
                                   <a:solidFill>
                                     <a:schemeClr val="tx1"/>
                                   </a:solidFill>
@@ -12147,6 +12147,7 @@
                 </a:endParaRPr>
               </a:p>
               <a:p>
+                <a:pPr/>
                 <a14:m>
                   <m:oMathPara xmlns:m="http://schemas.openxmlformats.org/officeDocument/2006/math">
                     <m:oMathParaPr>
@@ -12378,7 +12379,7 @@
             </p:txBody>
           </p:sp>
         </mc:Choice>
-        <mc:Fallback>
+        <mc:Fallback xmlns="">
           <p:sp>
             <p:nvSpPr>
               <p:cNvPr id="9" name="Rectangle 8">
@@ -13864,8 +13865,8 @@
           </a:p>
         </p:txBody>
       </p:sp>
-      <mc:AlternateContent xmlns:mc="http://schemas.openxmlformats.org/markup-compatibility/2006">
-        <mc:Choice xmlns:a14="http://schemas.microsoft.com/office/drawing/2010/main" Requires="a14">
+      <mc:AlternateContent xmlns:mc="http://schemas.openxmlformats.org/markup-compatibility/2006" xmlns:a14="http://schemas.microsoft.com/office/drawing/2010/main">
+        <mc:Choice Requires="a14">
           <p:sp>
             <p:nvSpPr>
               <p:cNvPr id="23" name="TextBox 22">
@@ -14007,11 +14008,9 @@
                 </a:endParaRPr>
               </a:p>
               <a:p>
-                <a:pPr/>
                 <a:endParaRPr lang="en-MY" sz="900" dirty="0"/>
               </a:p>
               <a:p>
-                <a:pPr/>
                 <a:r>
                   <a:rPr lang="en-MY" sz="900" dirty="0"/>
                   <a:t>Where  </a:t>
@@ -14182,7 +14181,7 @@
             </p:txBody>
           </p:sp>
         </mc:Choice>
-        <mc:Fallback>
+        <mc:Fallback xmlns="">
           <p:sp>
             <p:nvSpPr>
               <p:cNvPr id="23" name="TextBox 22">
@@ -14227,8 +14226,8 @@
           </p:sp>
         </mc:Fallback>
       </mc:AlternateContent>
-      <mc:AlternateContent xmlns:mc="http://schemas.openxmlformats.org/markup-compatibility/2006">
-        <mc:Choice xmlns:a14="http://schemas.microsoft.com/office/drawing/2010/main" Requires="a14">
+      <mc:AlternateContent xmlns:mc="http://schemas.openxmlformats.org/markup-compatibility/2006" xmlns:a14="http://schemas.microsoft.com/office/drawing/2010/main">
+        <mc:Choice Requires="a14">
           <p:sp>
             <p:nvSpPr>
               <p:cNvPr id="6" name="Rectangle 5">
@@ -14562,7 +14561,7 @@
             </p:txBody>
           </p:sp>
         </mc:Choice>
-        <mc:Fallback>
+        <mc:Fallback xmlns="">
           <p:sp>
             <p:nvSpPr>
               <p:cNvPr id="6" name="Rectangle 5">
@@ -16482,7 +16481,13 @@
                           <a:rPr lang="en-MY" sz="900">
                             <a:latin typeface="Cambria Math" panose="02040503050406030204" pitchFamily="18" charset="0"/>
                           </a:rPr>
-                          <m:t>=1</m:t>
+                          <m:t>=</m:t>
+                        </m:r>
+                        <m:r>
+                          <a:rPr lang="en-MY" sz="900">
+                            <a:latin typeface="Cambria Math" panose="02040503050406030204" pitchFamily="18" charset="0"/>
+                          </a:rPr>
+                          <m:t>1</m:t>
                         </m:r>
                       </m:sub>
                       <m:sup>
@@ -16756,7 +16761,13 @@
                           <a:rPr lang="en-MY" sz="900">
                             <a:latin typeface="Cambria Math" panose="02040503050406030204" pitchFamily="18" charset="0"/>
                           </a:rPr>
-                          <m:t>=1</m:t>
+                          <m:t>=</m:t>
+                        </m:r>
+                        <m:r>
+                          <a:rPr lang="en-MY" sz="900">
+                            <a:latin typeface="Cambria Math" panose="02040503050406030204" pitchFamily="18" charset="0"/>
+                          </a:rPr>
+                          <m:t>1</m:t>
                         </m:r>
                       </m:sub>
                       <m:sup>
@@ -17086,7 +17097,13 @@
                           <a:rPr lang="en-MY" sz="900">
                             <a:latin typeface="Cambria Math" panose="02040503050406030204" pitchFamily="18" charset="0"/>
                           </a:rPr>
-                          <m:t>=1</m:t>
+                          <m:t>=</m:t>
+                        </m:r>
+                        <m:r>
+                          <a:rPr lang="en-MY" sz="900">
+                            <a:latin typeface="Cambria Math" panose="02040503050406030204" pitchFamily="18" charset="0"/>
+                          </a:rPr>
+                          <m:t>1</m:t>
                         </m:r>
                       </m:sub>
                       <m:sup>
@@ -17372,7 +17389,13 @@
                           <a:rPr lang="en-MY" sz="900">
                             <a:latin typeface="Cambria Math" panose="02040503050406030204" pitchFamily="18" charset="0"/>
                           </a:rPr>
-                          <m:t>=1</m:t>
+                          <m:t>=</m:t>
+                        </m:r>
+                        <m:r>
+                          <a:rPr lang="en-MY" sz="900">
+                            <a:latin typeface="Cambria Math" panose="02040503050406030204" pitchFamily="18" charset="0"/>
+                          </a:rPr>
+                          <m:t>1</m:t>
                         </m:r>
                       </m:sub>
                       <m:sup>
@@ -19763,8 +19786,8 @@
           </a:fontRef>
         </p:style>
       </p:cxnSp>
-      <mc:AlternateContent xmlns:mc="http://schemas.openxmlformats.org/markup-compatibility/2006">
-        <mc:Choice xmlns:a14="http://schemas.microsoft.com/office/drawing/2010/main" Requires="a14">
+      <mc:AlternateContent xmlns:mc="http://schemas.openxmlformats.org/markup-compatibility/2006" xmlns:a14="http://schemas.microsoft.com/office/drawing/2010/main">
+        <mc:Choice Requires="a14">
           <p:sp>
             <p:nvSpPr>
               <p:cNvPr id="29" name="Rectangle 28">
@@ -20094,7 +20117,7 @@
             </p:txBody>
           </p:sp>
         </mc:Choice>
-        <mc:Fallback>
+        <mc:Fallback xmlns="">
           <p:sp>
             <p:nvSpPr>
               <p:cNvPr id="29" name="Rectangle 28">
@@ -25948,8 +25971,8 @@
           </a:p>
         </p:txBody>
       </p:sp>
-      <mc:AlternateContent xmlns:mc="http://schemas.openxmlformats.org/markup-compatibility/2006">
-        <mc:Choice xmlns:a14="http://schemas.microsoft.com/office/drawing/2010/main" Requires="a14">
+      <mc:AlternateContent xmlns:mc="http://schemas.openxmlformats.org/markup-compatibility/2006" xmlns:a14="http://schemas.microsoft.com/office/drawing/2010/main">
+        <mc:Choice Requires="a14">
           <p:sp>
             <p:nvSpPr>
               <p:cNvPr id="3" name="TextBox 2">
@@ -26739,7 +26762,7 @@
             </p:txBody>
           </p:sp>
         </mc:Choice>
-        <mc:Fallback>
+        <mc:Fallback xmlns="">
           <p:sp>
             <p:nvSpPr>
               <p:cNvPr id="3" name="TextBox 2">
@@ -26784,8 +26807,8 @@
           </p:sp>
         </mc:Fallback>
       </mc:AlternateContent>
-      <mc:AlternateContent xmlns:mc="http://schemas.openxmlformats.org/markup-compatibility/2006">
-        <mc:Choice xmlns:a14="http://schemas.microsoft.com/office/drawing/2010/main" Requires="a14">
+      <mc:AlternateContent xmlns:mc="http://schemas.openxmlformats.org/markup-compatibility/2006" xmlns:a14="http://schemas.microsoft.com/office/drawing/2010/main">
+        <mc:Choice Requires="a14">
           <p:sp>
             <p:nvSpPr>
               <p:cNvPr id="6" name="Rectangle 5">
@@ -26921,7 +26944,7 @@
             </p:txBody>
           </p:sp>
         </mc:Choice>
-        <mc:Fallback>
+        <mc:Fallback xmlns="">
           <p:sp>
             <p:nvSpPr>
               <p:cNvPr id="6" name="Rectangle 5">
@@ -27075,8 +27098,8 @@
           </a:p>
         </p:txBody>
       </p:sp>
-      <mc:AlternateContent xmlns:mc="http://schemas.openxmlformats.org/markup-compatibility/2006">
-        <mc:Choice xmlns:a14="http://schemas.microsoft.com/office/drawing/2010/main" Requires="a14">
+      <mc:AlternateContent xmlns:mc="http://schemas.openxmlformats.org/markup-compatibility/2006" xmlns:a14="http://schemas.microsoft.com/office/drawing/2010/main">
+        <mc:Choice Requires="a14">
           <p:sp>
             <p:nvSpPr>
               <p:cNvPr id="5" name="TextBox 4">
@@ -27382,6 +27405,7 @@
                 </a:endParaRPr>
               </a:p>
               <a:p>
+                <a:pPr/>
                 <a14:m>
                   <m:oMathPara xmlns:m="http://schemas.openxmlformats.org/officeDocument/2006/math">
                     <m:oMathParaPr>
@@ -27628,7 +27652,6 @@
                 </a:endParaRPr>
               </a:p>
               <a:p>
-                <a:pPr/>
                 <a:endParaRPr lang="en-MY" sz="1000" dirty="0">
                   <a:latin typeface="Arial" panose="020B0604020202020204" pitchFamily="34" charset="0"/>
                   <a:cs typeface="Arial" panose="020B0604020202020204" pitchFamily="34" charset="0"/>
@@ -27649,7 +27672,7 @@
             </p:txBody>
           </p:sp>
         </mc:Choice>
-        <mc:Fallback>
+        <mc:Fallback xmlns="">
           <p:sp>
             <p:nvSpPr>
               <p:cNvPr id="5" name="TextBox 4">
@@ -27694,8 +27717,8 @@
           </p:sp>
         </mc:Fallback>
       </mc:AlternateContent>
-      <mc:AlternateContent xmlns:mc="http://schemas.openxmlformats.org/markup-compatibility/2006">
-        <mc:Choice xmlns:a14="http://schemas.microsoft.com/office/drawing/2010/main" Requires="a14">
+      <mc:AlternateContent xmlns:mc="http://schemas.openxmlformats.org/markup-compatibility/2006" xmlns:a14="http://schemas.microsoft.com/office/drawing/2010/main">
+        <mc:Choice Requires="a14">
           <p:sp>
             <p:nvSpPr>
               <p:cNvPr id="6" name="Rectangle 5">
@@ -27728,6 +27751,7 @@
               </a:bodyPr>
               <a:lstStyle/>
               <a:p>
+                <a:pPr/>
                 <a14:m>
                   <m:oMathPara xmlns:m="http://schemas.openxmlformats.org/officeDocument/2006/math">
                     <m:oMathParaPr>
@@ -27889,7 +27913,7 @@
             </p:txBody>
           </p:sp>
         </mc:Choice>
-        <mc:Fallback>
+        <mc:Fallback xmlns="">
           <p:sp>
             <p:nvSpPr>
               <p:cNvPr id="6" name="Rectangle 5">
@@ -28235,13 +28259,7 @@
                           <a:rPr lang="en-MY" sz="900">
                             <a:latin typeface="Cambria Math" panose="02040503050406030204" pitchFamily="18" charset="0"/>
                           </a:rPr>
-                          <m:t>=</m:t>
-                        </m:r>
-                        <m:r>
-                          <a:rPr lang="en-MY" sz="900">
-                            <a:latin typeface="Cambria Math" panose="02040503050406030204" pitchFamily="18" charset="0"/>
-                          </a:rPr>
-                          <m:t>1</m:t>
+                          <m:t>=1</m:t>
                         </m:r>
                       </m:sub>
                       <m:sup>
@@ -28537,13 +28555,7 @@
                           <a:rPr lang="en-MY" sz="900">
                             <a:latin typeface="Cambria Math" panose="02040503050406030204" pitchFamily="18" charset="0"/>
                           </a:rPr>
-                          <m:t>=</m:t>
-                        </m:r>
-                        <m:r>
-                          <a:rPr lang="en-MY" sz="900">
-                            <a:latin typeface="Cambria Math" panose="02040503050406030204" pitchFamily="18" charset="0"/>
-                          </a:rPr>
-                          <m:t>1</m:t>
+                          <m:t>=1</m:t>
                         </m:r>
                       </m:sub>
                       <m:sup>
@@ -28838,13 +28850,7 @@
                           <a:rPr lang="en-MY" sz="900">
                             <a:latin typeface="Cambria Math" panose="02040503050406030204" pitchFamily="18" charset="0"/>
                           </a:rPr>
-                          <m:t>=</m:t>
-                        </m:r>
-                        <m:r>
-                          <a:rPr lang="en-MY" sz="900">
-                            <a:latin typeface="Cambria Math" panose="02040503050406030204" pitchFamily="18" charset="0"/>
-                          </a:rPr>
-                          <m:t>1</m:t>
+                          <m:t>=1</m:t>
                         </m:r>
                       </m:sub>
                       <m:sup>
@@ -29196,6 +29202,7 @@
               </a:bodyPr>
               <a:lstStyle/>
               <a:p>
+                <a:pPr/>
                 <a14:m>
                   <m:oMathPara xmlns:m="http://schemas.openxmlformats.org/officeDocument/2006/math">
                     <m:oMathParaPr>
@@ -29203,7 +29210,7 @@
                     </m:oMathParaPr>
                     <m:oMath xmlns:m="http://schemas.openxmlformats.org/officeDocument/2006/math">
                       <m:r>
-                        <a:rPr lang="en-MY" sz="1000" b="1" i="1">
+                        <a:rPr lang="en-MY" sz="1000" b="1" i="1" smtClean="0">
                           <a:latin typeface="Cambria Math" panose="02040503050406030204" pitchFamily="18" charset="0"/>
                           <a:cs typeface="Arial" panose="020B0604020202020204" pitchFamily="34" charset="0"/>
                         </a:rPr>
@@ -29280,47 +29287,12 @@
                           </m:ctrlPr>
                         </m:sSupPr>
                         <m:e>
-                          <m:d>
-                            <m:dPr>
-                              <m:ctrlPr>
-                                <a:rPr lang="en-MY" sz="1000" i="1">
-                                  <a:latin typeface="Cambria Math" panose="02040503050406030204" pitchFamily="18" charset="0"/>
-                                </a:rPr>
-                              </m:ctrlPr>
-                            </m:dPr>
-                            <m:e>
-                              <m:acc>
-                                <m:accPr>
-                                  <m:chr m:val="̂"/>
-                                  <m:ctrlPr>
-                                    <a:rPr lang="en-MY" sz="1000" b="1" i="1">
-                                      <a:latin typeface="Cambria Math" panose="02040503050406030204" pitchFamily="18" charset="0"/>
-                                    </a:rPr>
-                                  </m:ctrlPr>
-                                </m:accPr>
-                                <m:e>
-                                  <m:r>
-                                    <a:rPr lang="en-MY" sz="1000" b="1" i="1">
-                                      <a:latin typeface="Cambria Math" panose="02040503050406030204" pitchFamily="18" charset="0"/>
-                                    </a:rPr>
-                                    <m:t>𝒚</m:t>
-                                  </m:r>
-                                </m:e>
-                              </m:acc>
-                              <m:r>
-                                <a:rPr lang="en-MY" sz="1000" i="1">
-                                  <a:latin typeface="Cambria Math" panose="02040503050406030204" pitchFamily="18" charset="0"/>
-                                </a:rPr>
-                                <m:t>−</m:t>
-                              </m:r>
-                              <m:r>
-                                <a:rPr lang="en-MY" sz="1000" b="1" i="1">
-                                  <a:latin typeface="Cambria Math" panose="02040503050406030204" pitchFamily="18" charset="0"/>
-                                </a:rPr>
-                                <m:t>𝒚</m:t>
-                              </m:r>
-                            </m:e>
-                          </m:d>
+                          <m:r>
+                            <a:rPr lang="en-MY" sz="1000" b="1" i="1" smtClean="0">
+                              <a:latin typeface="Cambria Math" panose="02040503050406030204" pitchFamily="18" charset="0"/>
+                            </a:rPr>
+                            <m:t>𝑿</m:t>
+                          </m:r>
                         </m:e>
                         <m:sup>
                           <m:r>
@@ -29331,12 +29303,47 @@
                           </m:r>
                         </m:sup>
                       </m:sSup>
-                      <m:r>
-                        <a:rPr lang="en-MY" sz="1000" b="1" i="1">
-                          <a:latin typeface="Cambria Math" panose="02040503050406030204" pitchFamily="18" charset="0"/>
-                        </a:rPr>
-                        <m:t>𝑿</m:t>
-                      </m:r>
+                      <m:d>
+                        <m:dPr>
+                          <m:ctrlPr>
+                            <a:rPr lang="en-MY" sz="1000" i="1">
+                              <a:latin typeface="Cambria Math" panose="02040503050406030204" pitchFamily="18" charset="0"/>
+                            </a:rPr>
+                          </m:ctrlPr>
+                        </m:dPr>
+                        <m:e>
+                          <m:acc>
+                            <m:accPr>
+                              <m:chr m:val="̂"/>
+                              <m:ctrlPr>
+                                <a:rPr lang="en-MY" sz="1000" b="1" i="1">
+                                  <a:latin typeface="Cambria Math" panose="02040503050406030204" pitchFamily="18" charset="0"/>
+                                </a:rPr>
+                              </m:ctrlPr>
+                            </m:accPr>
+                            <m:e>
+                              <m:r>
+                                <a:rPr lang="en-MY" sz="1000" b="1" i="1">
+                                  <a:latin typeface="Cambria Math" panose="02040503050406030204" pitchFamily="18" charset="0"/>
+                                </a:rPr>
+                                <m:t>𝒚</m:t>
+                              </m:r>
+                            </m:e>
+                          </m:acc>
+                          <m:r>
+                            <a:rPr lang="en-MY" sz="1000" i="1">
+                              <a:latin typeface="Cambria Math" panose="02040503050406030204" pitchFamily="18" charset="0"/>
+                            </a:rPr>
+                            <m:t>−</m:t>
+                          </m:r>
+                          <m:r>
+                            <a:rPr lang="en-MY" sz="1000" b="1" i="1">
+                              <a:latin typeface="Cambria Math" panose="02040503050406030204" pitchFamily="18" charset="0"/>
+                            </a:rPr>
+                            <m:t>𝒚</m:t>
+                          </m:r>
+                        </m:e>
+                      </m:d>
                     </m:oMath>
                   </m:oMathPara>
                 </a14:m>
@@ -29398,8 +29405,8 @@
           </p:sp>
         </mc:Fallback>
       </mc:AlternateContent>
-      <mc:AlternateContent xmlns:mc="http://schemas.openxmlformats.org/markup-compatibility/2006">
-        <mc:Choice xmlns:a14="http://schemas.microsoft.com/office/drawing/2010/main" Requires="a14">
+      <mc:AlternateContent xmlns:mc="http://schemas.openxmlformats.org/markup-compatibility/2006" xmlns:a14="http://schemas.microsoft.com/office/drawing/2010/main">
+        <mc:Choice Requires="a14">
           <p:sp>
             <p:nvSpPr>
               <p:cNvPr id="4" name="Rectangle 3">
@@ -29427,6 +29434,7 @@
               </a:bodyPr>
               <a:lstStyle/>
               <a:p>
+                <a:pPr/>
                 <a14:m>
                   <m:oMathPara xmlns:m="http://schemas.openxmlformats.org/officeDocument/2006/math">
                     <m:oMathParaPr>
@@ -29586,7 +29594,7 @@
             </p:txBody>
           </p:sp>
         </mc:Choice>
-        <mc:Fallback>
+        <mc:Fallback xmlns="">
           <p:sp>
             <p:nvSpPr>
               <p:cNvPr id="4" name="Rectangle 3">
@@ -29672,8 +29680,8 @@
           </a:fontRef>
         </p:style>
       </p:cxnSp>
-      <mc:AlternateContent xmlns:mc="http://schemas.openxmlformats.org/markup-compatibility/2006">
-        <mc:Choice xmlns:a14="http://schemas.microsoft.com/office/drawing/2010/main" Requires="a14">
+      <mc:AlternateContent xmlns:mc="http://schemas.openxmlformats.org/markup-compatibility/2006" xmlns:a14="http://schemas.microsoft.com/office/drawing/2010/main">
+        <mc:Choice Requires="a14">
           <p:sp>
             <p:nvSpPr>
               <p:cNvPr id="11" name="TextBox 10">
@@ -29762,7 +29770,7 @@
             </p:txBody>
           </p:sp>
         </mc:Choice>
-        <mc:Fallback>
+        <mc:Fallback xmlns="">
           <p:sp>
             <p:nvSpPr>
               <p:cNvPr id="11" name="TextBox 10">
@@ -29865,7 +29873,7 @@
           <a:p>
             <a:r>
               <a:rPr lang="en-MY" dirty="0"/>
-              <a:t>Polynomial Regression</a:t>
+              <a:t>Polynomial Regression (and others)</a:t>
             </a:r>
           </a:p>
         </p:txBody>
@@ -29907,8 +29915,8 @@
           </a:p>
         </p:txBody>
       </p:sp>
-      <mc:AlternateContent xmlns:mc="http://schemas.openxmlformats.org/markup-compatibility/2006" xmlns:a14="http://schemas.microsoft.com/office/drawing/2010/main">
-        <mc:Choice Requires="a14">
+      <mc:AlternateContent xmlns:mc="http://schemas.openxmlformats.org/markup-compatibility/2006">
+        <mc:Choice xmlns:a14="http://schemas.microsoft.com/office/drawing/2010/main" Requires="a14">
           <p:sp>
             <p:nvSpPr>
               <p:cNvPr id="4" name="Rectangle 3">
@@ -29923,8 +29931,8 @@
             </p:nvSpPr>
             <p:spPr>
               <a:xfrm>
-                <a:off x="370050" y="1241788"/>
-                <a:ext cx="4005000" cy="1326902"/>
+                <a:off x="415050" y="1055375"/>
+                <a:ext cx="4005000" cy="1960537"/>
               </a:xfrm>
               <a:prstGeom prst="rect">
                 <a:avLst/>
@@ -30381,6 +30389,229 @@
                 </a:endParaRPr>
               </a:p>
               <a:p>
+                <a:pPr/>
+                <a:endParaRPr lang="en-MY" sz="1000" dirty="0">
+                  <a:latin typeface="Arial" panose="020B0604020202020204" pitchFamily="34" charset="0"/>
+                </a:endParaRPr>
+              </a:p>
+              <a:p>
+                <a:r>
+                  <a:rPr lang="en-MY" sz="1000" dirty="0">
+                    <a:latin typeface="Arial" panose="020B0604020202020204" pitchFamily="34" charset="0"/>
+                    <a:cs typeface="Arial" panose="020B0604020202020204" pitchFamily="34" charset="0"/>
+                  </a:rPr>
+                  <a:t>       Non-Linear</a:t>
+                </a:r>
+              </a:p>
+              <a:p>
+                <a:endParaRPr lang="en-MY" sz="1000" dirty="0">
+                  <a:latin typeface="Arial" panose="020B0604020202020204" pitchFamily="34" charset="0"/>
+                  <a:cs typeface="Arial" panose="020B0604020202020204" pitchFamily="34" charset="0"/>
+                </a:endParaRPr>
+              </a:p>
+              <a:p>
+                <a:pPr/>
+                <a14:m>
+                  <m:oMathPara xmlns:m="http://schemas.openxmlformats.org/officeDocument/2006/math">
+                    <m:oMathParaPr>
+                      <m:jc m:val="centerGroup"/>
+                    </m:oMathParaPr>
+                    <m:oMath xmlns:m="http://schemas.openxmlformats.org/officeDocument/2006/math">
+                      <m:acc>
+                        <m:accPr>
+                          <m:chr m:val="̂"/>
+                          <m:ctrlPr>
+                            <a:rPr lang="en-MY" sz="1000" i="1">
+                              <a:latin typeface="Cambria Math" panose="02040503050406030204" pitchFamily="18" charset="0"/>
+                            </a:rPr>
+                          </m:ctrlPr>
+                        </m:accPr>
+                        <m:e>
+                          <m:r>
+                            <a:rPr lang="en-MY" sz="1000" i="1">
+                              <a:latin typeface="Cambria Math" panose="02040503050406030204" pitchFamily="18" charset="0"/>
+                            </a:rPr>
+                            <m:t>𝑦</m:t>
+                          </m:r>
+                        </m:e>
+                      </m:acc>
+                      <m:r>
+                        <a:rPr lang="en-MY" sz="1000">
+                          <a:latin typeface="Cambria Math" panose="02040503050406030204" pitchFamily="18" charset="0"/>
+                        </a:rPr>
+                        <m:t>=</m:t>
+                      </m:r>
+                      <m:sSub>
+                        <m:sSubPr>
+                          <m:ctrlPr>
+                            <a:rPr lang="en-MY" sz="1000" i="1">
+                              <a:latin typeface="Cambria Math" panose="02040503050406030204" pitchFamily="18" charset="0"/>
+                            </a:rPr>
+                          </m:ctrlPr>
+                        </m:sSubPr>
+                        <m:e>
+                          <m:r>
+                            <a:rPr lang="en-MY" sz="1000">
+                              <a:latin typeface="Cambria Math" panose="02040503050406030204" pitchFamily="18" charset="0"/>
+                            </a:rPr>
+                            <m:t>𝑤</m:t>
+                          </m:r>
+                        </m:e>
+                        <m:sub>
+                          <m:r>
+                            <a:rPr lang="en-MY" sz="1000">
+                              <a:latin typeface="Cambria Math" panose="02040503050406030204" pitchFamily="18" charset="0"/>
+                            </a:rPr>
+                            <m:t>0</m:t>
+                          </m:r>
+                        </m:sub>
+                      </m:sSub>
+                      <m:r>
+                        <a:rPr lang="en-MY" sz="1000">
+                          <a:latin typeface="Cambria Math" panose="02040503050406030204" pitchFamily="18" charset="0"/>
+                        </a:rPr>
+                        <m:t>+</m:t>
+                      </m:r>
+                      <m:sSub>
+                        <m:sSubPr>
+                          <m:ctrlPr>
+                            <a:rPr lang="en-MY" sz="1000" i="1">
+                              <a:latin typeface="Cambria Math" panose="02040503050406030204" pitchFamily="18" charset="0"/>
+                            </a:rPr>
+                          </m:ctrlPr>
+                        </m:sSubPr>
+                        <m:e>
+                          <m:r>
+                            <a:rPr lang="en-MY" sz="1000">
+                              <a:latin typeface="Cambria Math" panose="02040503050406030204" pitchFamily="18" charset="0"/>
+                            </a:rPr>
+                            <m:t>𝑤</m:t>
+                          </m:r>
+                        </m:e>
+                        <m:sub>
+                          <m:r>
+                            <a:rPr lang="en-MY" sz="1000">
+                              <a:latin typeface="Cambria Math" panose="02040503050406030204" pitchFamily="18" charset="0"/>
+                            </a:rPr>
+                            <m:t>1</m:t>
+                          </m:r>
+                        </m:sub>
+                      </m:sSub>
+                      <m:r>
+                        <a:rPr lang="en-MY" sz="1000">
+                          <a:latin typeface="Cambria Math" panose="02040503050406030204" pitchFamily="18" charset="0"/>
+                        </a:rPr>
+                        <m:t>∗</m:t>
+                      </m:r>
+                      <m:sSub>
+                        <m:sSubPr>
+                          <m:ctrlPr>
+                            <a:rPr lang="en-MY" sz="1000" i="1">
+                              <a:latin typeface="Cambria Math" panose="02040503050406030204" pitchFamily="18" charset="0"/>
+                            </a:rPr>
+                          </m:ctrlPr>
+                        </m:sSubPr>
+                        <m:e>
+                          <m:r>
+                            <a:rPr lang="en-MY" sz="1000" i="1">
+                              <a:latin typeface="Cambria Math" panose="02040503050406030204" pitchFamily="18" charset="0"/>
+                            </a:rPr>
+                            <m:t>𝑥</m:t>
+                          </m:r>
+                        </m:e>
+                        <m:sub>
+                          <m:r>
+                            <a:rPr lang="en-MY" sz="1000">
+                              <a:latin typeface="Cambria Math" panose="02040503050406030204" pitchFamily="18" charset="0"/>
+                            </a:rPr>
+                            <m:t>1</m:t>
+                          </m:r>
+                        </m:sub>
+                      </m:sSub>
+                      <m:r>
+                        <a:rPr lang="en-MY" sz="1000" i="1">
+                          <a:latin typeface="Cambria Math" panose="02040503050406030204" pitchFamily="18" charset="0"/>
+                        </a:rPr>
+                        <m:t>+</m:t>
+                      </m:r>
+                      <m:sSub>
+                        <m:sSubPr>
+                          <m:ctrlPr>
+                            <a:rPr lang="en-MY" sz="1000" i="1">
+                              <a:latin typeface="Cambria Math" panose="02040503050406030204" pitchFamily="18" charset="0"/>
+                            </a:rPr>
+                          </m:ctrlPr>
+                        </m:sSubPr>
+                        <m:e>
+                          <m:r>
+                            <a:rPr lang="en-MY" sz="1000">
+                              <a:latin typeface="Cambria Math" panose="02040503050406030204" pitchFamily="18" charset="0"/>
+                            </a:rPr>
+                            <m:t>𝑤</m:t>
+                          </m:r>
+                        </m:e>
+                        <m:sub>
+                          <m:r>
+                            <a:rPr lang="en-MY" sz="1000">
+                              <a:latin typeface="Cambria Math" panose="02040503050406030204" pitchFamily="18" charset="0"/>
+                            </a:rPr>
+                            <m:t>2</m:t>
+                          </m:r>
+                        </m:sub>
+                      </m:sSub>
+                      <m:r>
+                        <a:rPr lang="en-MY" sz="1000" i="1">
+                          <a:latin typeface="Cambria Math" panose="02040503050406030204" pitchFamily="18" charset="0"/>
+                        </a:rPr>
+                        <m:t>∗</m:t>
+                      </m:r>
+                      <m:f>
+                        <m:fPr>
+                          <m:ctrlPr>
+                            <a:rPr lang="en-MY" sz="1000" i="1" smtClean="0">
+                              <a:latin typeface="Cambria Math" panose="02040503050406030204" pitchFamily="18" charset="0"/>
+                            </a:rPr>
+                          </m:ctrlPr>
+                        </m:fPr>
+                        <m:num>
+                          <m:r>
+                            <a:rPr lang="en-MY" sz="1000" b="0" i="1" smtClean="0">
+                              <a:latin typeface="Cambria Math" panose="02040503050406030204" pitchFamily="18" charset="0"/>
+                            </a:rPr>
+                            <m:t>1</m:t>
+                          </m:r>
+                        </m:num>
+                        <m:den>
+                          <m:sSub>
+                            <m:sSubPr>
+                              <m:ctrlPr>
+                                <a:rPr lang="en-MY" sz="1000" i="1">
+                                  <a:latin typeface="Cambria Math" panose="02040503050406030204" pitchFamily="18" charset="0"/>
+                                </a:rPr>
+                              </m:ctrlPr>
+                            </m:sSubPr>
+                            <m:e>
+                              <m:r>
+                                <a:rPr lang="en-MY" sz="1000" i="1">
+                                  <a:latin typeface="Cambria Math" panose="02040503050406030204" pitchFamily="18" charset="0"/>
+                                </a:rPr>
+                                <m:t>𝑥</m:t>
+                              </m:r>
+                            </m:e>
+                            <m:sub>
+                              <m:r>
+                                <a:rPr lang="en-MY" sz="1000">
+                                  <a:latin typeface="Cambria Math" panose="02040503050406030204" pitchFamily="18" charset="0"/>
+                                </a:rPr>
+                                <m:t>1</m:t>
+                              </m:r>
+                            </m:sub>
+                          </m:sSub>
+                        </m:den>
+                      </m:f>
+                    </m:oMath>
+                  </m:oMathPara>
+                </a14:m>
                 <a:endParaRPr lang="en-MY" sz="1000" dirty="0">
                   <a:latin typeface="Arial" panose="020B0604020202020204" pitchFamily="34" charset="0"/>
                   <a:cs typeface="Arial" panose="020B0604020202020204" pitchFamily="34" charset="0"/>
@@ -30389,7 +30620,7 @@
             </p:txBody>
           </p:sp>
         </mc:Choice>
-        <mc:Fallback xmlns="">
+        <mc:Fallback>
           <p:sp>
             <p:nvSpPr>
               <p:cNvPr id="4" name="Rectangle 3">
@@ -30406,8 +30637,8 @@
             </p:nvSpPr>
             <p:spPr>
               <a:xfrm>
-                <a:off x="370050" y="1241788"/>
-                <a:ext cx="4005000" cy="1326902"/>
+                <a:off x="415050" y="1055375"/>
+                <a:ext cx="4005000" cy="1960537"/>
               </a:xfrm>
               <a:prstGeom prst="rect">
                 <a:avLst/>
@@ -30415,7 +30646,7 @@
               <a:blipFill>
                 <a:blip r:embed="rId2"/>
                 <a:stretch>
-                  <a:fillRect t="-461"/>
+                  <a:fillRect/>
                 </a:stretch>
               </a:blipFill>
             </p:spPr>
@@ -30638,7 +30869,14 @@
                             <a:latin typeface="Cambria Math" panose="02040503050406030204" pitchFamily="18" charset="0"/>
                             <a:cs typeface="Arial" panose="020B0604020202020204" pitchFamily="34" charset="0"/>
                           </a:rPr>
-                          <m:t>−1</m:t>
+                          <m:t>−</m:t>
+                        </m:r>
+                        <m:r>
+                          <a:rPr lang="en-MY" sz="1000" b="0" i="1" smtClean="0">
+                            <a:latin typeface="Cambria Math" panose="02040503050406030204" pitchFamily="18" charset="0"/>
+                            <a:cs typeface="Arial" panose="020B0604020202020204" pitchFamily="34" charset="0"/>
+                          </a:rPr>
+                          <m:t>1</m:t>
                         </m:r>
                         <m:r>
                           <a:rPr lang="en-MY" sz="1000" i="1" smtClean="0">
@@ -31324,8 +31562,8 @@
           </a:p>
         </p:txBody>
       </p:sp>
-      <mc:AlternateContent xmlns:mc="http://schemas.openxmlformats.org/markup-compatibility/2006">
-        <mc:Choice xmlns:a14="http://schemas.microsoft.com/office/drawing/2010/main" Requires="a14">
+      <mc:AlternateContent xmlns:mc="http://schemas.openxmlformats.org/markup-compatibility/2006" xmlns:a14="http://schemas.microsoft.com/office/drawing/2010/main">
+        <mc:Choice Requires="a14">
           <p:sp>
             <p:nvSpPr>
               <p:cNvPr id="4" name="Rectangle 3">
@@ -31684,7 +31922,7 @@
             </p:txBody>
           </p:sp>
         </mc:Choice>
-        <mc:Fallback>
+        <mc:Fallback xmlns="">
           <p:sp>
             <p:nvSpPr>
               <p:cNvPr id="4" name="Rectangle 3">
@@ -31729,8 +31967,8 @@
           </p:sp>
         </mc:Fallback>
       </mc:AlternateContent>
-      <mc:AlternateContent xmlns:mc="http://schemas.openxmlformats.org/markup-compatibility/2006">
-        <mc:Choice xmlns:a14="http://schemas.microsoft.com/office/drawing/2010/main" Requires="a14">
+      <mc:AlternateContent xmlns:mc="http://schemas.openxmlformats.org/markup-compatibility/2006" xmlns:a14="http://schemas.microsoft.com/office/drawing/2010/main">
+        <mc:Choice Requires="a14">
           <p:sp>
             <p:nvSpPr>
               <p:cNvPr id="7" name="Rectangle 6">
@@ -31914,7 +32152,7 @@
             </p:txBody>
           </p:sp>
         </mc:Choice>
-        <mc:Fallback>
+        <mc:Fallback xmlns="">
           <p:sp>
             <p:nvSpPr>
               <p:cNvPr id="7" name="Rectangle 6">
@@ -31959,8 +32197,8 @@
           </p:sp>
         </mc:Fallback>
       </mc:AlternateContent>
-      <mc:AlternateContent xmlns:mc="http://schemas.openxmlformats.org/markup-compatibility/2006">
-        <mc:Choice xmlns:a14="http://schemas.microsoft.com/office/drawing/2010/main" Requires="a14">
+      <mc:AlternateContent xmlns:mc="http://schemas.openxmlformats.org/markup-compatibility/2006" xmlns:a14="http://schemas.microsoft.com/office/drawing/2010/main">
+        <mc:Choice Requires="a14">
           <p:sp>
             <p:nvSpPr>
               <p:cNvPr id="8" name="Rectangle 7">
@@ -32120,7 +32358,7 @@
             </p:txBody>
           </p:sp>
         </mc:Choice>
-        <mc:Fallback>
+        <mc:Fallback xmlns="">
           <p:sp>
             <p:nvSpPr>
               <p:cNvPr id="8" name="Rectangle 7">

</xml_diff>